<commit_message>
New text gen function with top_p support
</commit_message>
<xml_diff>
--- a/pictures/drawings.pptx
+++ b/pictures/drawings.pptx
@@ -261,7 +261,7 @@
           <a:p>
             <a:fld id="{4B21A34F-9ACB-4B9A-AC90-B216D47E3709}" type="datetimeFigureOut">
               <a:rPr lang="en-GB" smtClean="0"/>
-              <a:t>30/10/2025</a:t>
+              <a:t>10/11/2025</a:t>
             </a:fld>
             <a:endParaRPr lang="en-GB"/>
           </a:p>
@@ -461,7 +461,7 @@
           <a:p>
             <a:fld id="{4B21A34F-9ACB-4B9A-AC90-B216D47E3709}" type="datetimeFigureOut">
               <a:rPr lang="en-GB" smtClean="0"/>
-              <a:t>30/10/2025</a:t>
+              <a:t>10/11/2025</a:t>
             </a:fld>
             <a:endParaRPr lang="en-GB"/>
           </a:p>
@@ -671,7 +671,7 @@
           <a:p>
             <a:fld id="{4B21A34F-9ACB-4B9A-AC90-B216D47E3709}" type="datetimeFigureOut">
               <a:rPr lang="en-GB" smtClean="0"/>
-              <a:t>30/10/2025</a:t>
+              <a:t>10/11/2025</a:t>
             </a:fld>
             <a:endParaRPr lang="en-GB"/>
           </a:p>
@@ -871,7 +871,7 @@
           <a:p>
             <a:fld id="{4B21A34F-9ACB-4B9A-AC90-B216D47E3709}" type="datetimeFigureOut">
               <a:rPr lang="en-GB" smtClean="0"/>
-              <a:t>30/10/2025</a:t>
+              <a:t>10/11/2025</a:t>
             </a:fld>
             <a:endParaRPr lang="en-GB"/>
           </a:p>
@@ -1147,7 +1147,7 @@
           <a:p>
             <a:fld id="{4B21A34F-9ACB-4B9A-AC90-B216D47E3709}" type="datetimeFigureOut">
               <a:rPr lang="en-GB" smtClean="0"/>
-              <a:t>30/10/2025</a:t>
+              <a:t>10/11/2025</a:t>
             </a:fld>
             <a:endParaRPr lang="en-GB"/>
           </a:p>
@@ -1415,7 +1415,7 @@
           <a:p>
             <a:fld id="{4B21A34F-9ACB-4B9A-AC90-B216D47E3709}" type="datetimeFigureOut">
               <a:rPr lang="en-GB" smtClean="0"/>
-              <a:t>30/10/2025</a:t>
+              <a:t>10/11/2025</a:t>
             </a:fld>
             <a:endParaRPr lang="en-GB"/>
           </a:p>
@@ -1830,7 +1830,7 @@
           <a:p>
             <a:fld id="{4B21A34F-9ACB-4B9A-AC90-B216D47E3709}" type="datetimeFigureOut">
               <a:rPr lang="en-GB" smtClean="0"/>
-              <a:t>30/10/2025</a:t>
+              <a:t>10/11/2025</a:t>
             </a:fld>
             <a:endParaRPr lang="en-GB"/>
           </a:p>
@@ -1972,7 +1972,7 @@
           <a:p>
             <a:fld id="{4B21A34F-9ACB-4B9A-AC90-B216D47E3709}" type="datetimeFigureOut">
               <a:rPr lang="en-GB" smtClean="0"/>
-              <a:t>30/10/2025</a:t>
+              <a:t>10/11/2025</a:t>
             </a:fld>
             <a:endParaRPr lang="en-GB"/>
           </a:p>
@@ -2085,7 +2085,7 @@
           <a:p>
             <a:fld id="{4B21A34F-9ACB-4B9A-AC90-B216D47E3709}" type="datetimeFigureOut">
               <a:rPr lang="en-GB" smtClean="0"/>
-              <a:t>30/10/2025</a:t>
+              <a:t>10/11/2025</a:t>
             </a:fld>
             <a:endParaRPr lang="en-GB"/>
           </a:p>
@@ -2398,7 +2398,7 @@
           <a:p>
             <a:fld id="{4B21A34F-9ACB-4B9A-AC90-B216D47E3709}" type="datetimeFigureOut">
               <a:rPr lang="en-GB" smtClean="0"/>
-              <a:t>30/10/2025</a:t>
+              <a:t>10/11/2025</a:t>
             </a:fld>
             <a:endParaRPr lang="en-GB"/>
           </a:p>
@@ -2687,7 +2687,7 @@
           <a:p>
             <a:fld id="{4B21A34F-9ACB-4B9A-AC90-B216D47E3709}" type="datetimeFigureOut">
               <a:rPr lang="en-GB" smtClean="0"/>
-              <a:t>30/10/2025</a:t>
+              <a:t>10/11/2025</a:t>
             </a:fld>
             <a:endParaRPr lang="en-GB"/>
           </a:p>
@@ -2930,7 +2930,7 @@
           <a:p>
             <a:fld id="{4B21A34F-9ACB-4B9A-AC90-B216D47E3709}" type="datetimeFigureOut">
               <a:rPr lang="en-GB" smtClean="0"/>
-              <a:t>30/10/2025</a:t>
+              <a:t>10/11/2025</a:t>
             </a:fld>
             <a:endParaRPr lang="en-GB"/>
           </a:p>
@@ -3361,8 +3361,8 @@
         </p:nvSpPr>
         <p:spPr>
           <a:xfrm>
-            <a:off x="2608546" y="769361"/>
-            <a:ext cx="4191000" cy="5522460"/>
+            <a:off x="2608546" y="1076325"/>
+            <a:ext cx="4191000" cy="5215495"/>
           </a:xfrm>
           <a:prstGeom prst="rect">
             <a:avLst/>
@@ -3422,8 +3422,8 @@
         </p:nvSpPr>
         <p:spPr>
           <a:xfrm>
-            <a:off x="3190876" y="1703613"/>
-            <a:ext cx="3009890" cy="3640139"/>
+            <a:off x="3190876" y="1624017"/>
+            <a:ext cx="3009890" cy="3719735"/>
           </a:xfrm>
           <a:prstGeom prst="rect">
             <a:avLst/>
@@ -3924,7 +3924,7 @@
         </p:nvSpPr>
         <p:spPr>
           <a:xfrm>
-            <a:off x="3724271" y="1303564"/>
+            <a:off x="3724271" y="1232133"/>
             <a:ext cx="1943100" cy="200025"/>
           </a:xfrm>
           <a:prstGeom prst="rect">
@@ -3973,70 +3973,6 @@
       </p:sp>
       <p:sp>
         <p:nvSpPr>
-          <p:cNvPr id="13" name="Rectangle 12">
-            <a:extLst>
-              <a:ext uri="{FF2B5EF4-FFF2-40B4-BE49-F238E27FC236}">
-                <a16:creationId xmlns:a16="http://schemas.microsoft.com/office/drawing/2014/main" id="{E6AE26B0-E2ED-AB88-79A0-66563BF214A2}"/>
-              </a:ext>
-            </a:extLst>
-          </p:cNvPr>
-          <p:cNvSpPr/>
-          <p:nvPr/>
-        </p:nvSpPr>
-        <p:spPr>
-          <a:xfrm>
-            <a:off x="3724271" y="933676"/>
-            <a:ext cx="1943100" cy="200025"/>
-          </a:xfrm>
-          <a:prstGeom prst="rect">
-            <a:avLst/>
-          </a:prstGeom>
-          <a:solidFill>
-            <a:schemeClr val="accent6">
-              <a:lumMod val="40000"/>
-              <a:lumOff val="60000"/>
-            </a:schemeClr>
-          </a:solidFill>
-          <a:ln w="12700">
-            <a:solidFill>
-              <a:schemeClr val="tx1"/>
-            </a:solidFill>
-          </a:ln>
-        </p:spPr>
-        <p:style>
-          <a:lnRef idx="2">
-            <a:schemeClr val="accent1">
-              <a:shade val="15000"/>
-            </a:schemeClr>
-          </a:lnRef>
-          <a:fillRef idx="1">
-            <a:schemeClr val="accent1"/>
-          </a:fillRef>
-          <a:effectRef idx="0">
-            <a:schemeClr val="accent1"/>
-          </a:effectRef>
-          <a:fontRef idx="minor">
-            <a:schemeClr val="lt1"/>
-          </a:fontRef>
-        </p:style>
-        <p:txBody>
-          <a:bodyPr rtlCol="0" anchor="ctr"/>
-          <a:lstStyle/>
-          <a:p>
-            <a:pPr algn="ctr"/>
-            <a:r>
-              <a:rPr lang="en-GB" sz="1100" dirty="0">
-                <a:solidFill>
-                  <a:schemeClr val="tx1"/>
-                </a:solidFill>
-              </a:rPr>
-              <a:t>Linear Output Layer</a:t>
-            </a:r>
-          </a:p>
-        </p:txBody>
-      </p:sp>
-      <p:sp>
-        <p:nvSpPr>
           <p:cNvPr id="14" name="Rectangle 13">
             <a:extLst>
               <a:ext uri="{FF2B5EF4-FFF2-40B4-BE49-F238E27FC236}">
@@ -4632,58 +4568,15 @@
           </p:cNvPr>
           <p:cNvCxnSpPr>
             <a:cxnSpLocks/>
+            <a:stCxn id="17" idx="0"/>
             <a:endCxn id="12" idx="2"/>
           </p:cNvCxnSpPr>
           <p:nvPr/>
         </p:nvCxnSpPr>
         <p:spPr>
           <a:xfrm flipV="1">
-            <a:off x="4695821" y="1503589"/>
-            <a:ext cx="0" cy="322263"/>
-          </a:xfrm>
-          <a:prstGeom prst="straightConnector1">
-            <a:avLst/>
-          </a:prstGeom>
-          <a:ln w="12700">
-            <a:solidFill>
-              <a:schemeClr val="tx1"/>
-            </a:solidFill>
-            <a:tailEnd type="triangle"/>
-          </a:ln>
-        </p:spPr>
-        <p:style>
-          <a:lnRef idx="2">
-            <a:schemeClr val="accent1"/>
-          </a:lnRef>
-          <a:fillRef idx="0">
-            <a:schemeClr val="accent1"/>
-          </a:fillRef>
-          <a:effectRef idx="1">
-            <a:schemeClr val="accent1"/>
-          </a:effectRef>
-          <a:fontRef idx="minor">
-            <a:schemeClr val="tx1"/>
-          </a:fontRef>
-        </p:style>
-      </p:cxnSp>
-      <p:cxnSp>
-        <p:nvCxnSpPr>
-          <p:cNvPr id="41" name="Straight Arrow Connector 40">
-            <a:extLst>
-              <a:ext uri="{FF2B5EF4-FFF2-40B4-BE49-F238E27FC236}">
-                <a16:creationId xmlns:a16="http://schemas.microsoft.com/office/drawing/2014/main" id="{917706D6-B4D1-CA22-623A-C7912623A5BF}"/>
-              </a:ext>
-            </a:extLst>
-          </p:cNvPr>
-          <p:cNvCxnSpPr>
-            <a:cxnSpLocks/>
-          </p:cNvCxnSpPr>
-          <p:nvPr/>
-        </p:nvCxnSpPr>
-        <p:spPr>
-          <a:xfrm flipV="1">
-            <a:off x="4695821" y="1133701"/>
-            <a:ext cx="0" cy="169863"/>
+            <a:off x="4695821" y="1432158"/>
+            <a:ext cx="0" cy="393694"/>
           </a:xfrm>
           <a:prstGeom prst="straightConnector1">
             <a:avLst/>
@@ -4980,23 +4873,24 @@
       </p:cxnSp>
       <p:cxnSp>
         <p:nvCxnSpPr>
-          <p:cNvPr id="103" name="Straight Arrow Connector 102">
-            <a:extLst>
-              <a:ext uri="{FF2B5EF4-FFF2-40B4-BE49-F238E27FC236}">
-                <a16:creationId xmlns:a16="http://schemas.microsoft.com/office/drawing/2014/main" id="{D802427B-C7BC-4B43-F44B-5D13875F76B0}"/>
+          <p:cNvPr id="106" name="Straight Arrow Connector 105">
+            <a:extLst>
+              <a:ext uri="{FF2B5EF4-FFF2-40B4-BE49-F238E27FC236}">
+                <a16:creationId xmlns:a16="http://schemas.microsoft.com/office/drawing/2014/main" id="{82CED454-2917-3B0D-C923-0B121D0AD7D6}"/>
               </a:ext>
             </a:extLst>
           </p:cNvPr>
           <p:cNvCxnSpPr>
             <a:cxnSpLocks/>
-            <a:stCxn id="13" idx="0"/>
+            <a:stCxn id="126" idx="0"/>
+            <a:endCxn id="5" idx="2"/>
           </p:cNvCxnSpPr>
           <p:nvPr/>
         </p:nvCxnSpPr>
         <p:spPr>
           <a:xfrm flipH="1" flipV="1">
-            <a:off x="4694868" y="528864"/>
-            <a:ext cx="953" cy="404812"/>
+            <a:off x="4704046" y="6084397"/>
+            <a:ext cx="4249" cy="353863"/>
           </a:xfrm>
           <a:prstGeom prst="straightConnector1">
             <a:avLst/>
@@ -5023,26 +4917,352 @@
           </a:fontRef>
         </p:style>
       </p:cxnSp>
+      <p:sp>
+        <p:nvSpPr>
+          <p:cNvPr id="117" name="TextBox 116">
+            <a:extLst>
+              <a:ext uri="{FF2B5EF4-FFF2-40B4-BE49-F238E27FC236}">
+                <a16:creationId xmlns:a16="http://schemas.microsoft.com/office/drawing/2014/main" id="{B4116A31-89B9-DA09-13DC-7CD905EAC59A}"/>
+              </a:ext>
+            </a:extLst>
+          </p:cNvPr>
+          <p:cNvSpPr txBox="1"/>
+          <p:nvPr/>
+        </p:nvSpPr>
+        <p:spPr>
+          <a:xfrm>
+            <a:off x="3203346" y="1641032"/>
+            <a:ext cx="1263873" cy="307777"/>
+          </a:xfrm>
+          <a:prstGeom prst="rect">
+            <a:avLst/>
+          </a:prstGeom>
+          <a:noFill/>
+        </p:spPr>
+        <p:txBody>
+          <a:bodyPr wrap="square" rtlCol="0">
+            <a:spAutoFit/>
+          </a:bodyPr>
+          <a:lstStyle/>
+          <a:p>
+            <a:pPr algn="ctr"/>
+            <a:r>
+              <a:rPr lang="en-GB" sz="1400" dirty="0"/>
+              <a:t>Transformer</a:t>
+            </a:r>
+          </a:p>
+        </p:txBody>
+      </p:sp>
+      <p:sp>
+        <p:nvSpPr>
+          <p:cNvPr id="118" name="TextBox 117">
+            <a:extLst>
+              <a:ext uri="{FF2B5EF4-FFF2-40B4-BE49-F238E27FC236}">
+                <a16:creationId xmlns:a16="http://schemas.microsoft.com/office/drawing/2014/main" id="{439F4E1A-0DB3-1138-47F0-02D9827B359C}"/>
+              </a:ext>
+            </a:extLst>
+          </p:cNvPr>
+          <p:cNvSpPr txBox="1"/>
+          <p:nvPr/>
+        </p:nvSpPr>
+        <p:spPr>
+          <a:xfrm>
+            <a:off x="2608547" y="1089755"/>
+            <a:ext cx="1010950" cy="523220"/>
+          </a:xfrm>
+          <a:prstGeom prst="rect">
+            <a:avLst/>
+          </a:prstGeom>
+          <a:noFill/>
+        </p:spPr>
+        <p:txBody>
+          <a:bodyPr wrap="square" rtlCol="0">
+            <a:spAutoFit/>
+          </a:bodyPr>
+          <a:lstStyle/>
+          <a:p>
+            <a:pPr algn="ctr"/>
+            <a:r>
+              <a:rPr lang="en-GB" sz="1400" dirty="0"/>
+              <a:t>GPT-2</a:t>
+            </a:r>
+            <a:br>
+              <a:rPr lang="en-GB" sz="1400" dirty="0"/>
+            </a:br>
+            <a:r>
+              <a:rPr lang="en-GB" sz="1400" dirty="0"/>
+              <a:t>Model</a:t>
+            </a:r>
+          </a:p>
+        </p:txBody>
+      </p:sp>
+      <p:sp>
+        <p:nvSpPr>
+          <p:cNvPr id="119" name="TextBox 118">
+            <a:extLst>
+              <a:ext uri="{FF2B5EF4-FFF2-40B4-BE49-F238E27FC236}">
+                <a16:creationId xmlns:a16="http://schemas.microsoft.com/office/drawing/2014/main" id="{4056CF37-1FCE-8CE6-D031-404C6C3C7624}"/>
+              </a:ext>
+            </a:extLst>
+          </p:cNvPr>
+          <p:cNvSpPr txBox="1"/>
+          <p:nvPr/>
+        </p:nvSpPr>
+        <p:spPr>
+          <a:xfrm rot="16200000">
+            <a:off x="1240391" y="3388861"/>
+            <a:ext cx="3601999" cy="307777"/>
+          </a:xfrm>
+          <a:prstGeom prst="rect">
+            <a:avLst/>
+          </a:prstGeom>
+          <a:noFill/>
+        </p:spPr>
+        <p:txBody>
+          <a:bodyPr wrap="square" rtlCol="0">
+            <a:spAutoFit/>
+          </a:bodyPr>
+          <a:lstStyle/>
+          <a:p>
+            <a:pPr algn="ctr"/>
+            <a:r>
+              <a:rPr lang="en-GB" sz="1400" dirty="0"/>
+              <a:t>Stacked N times</a:t>
+            </a:r>
+          </a:p>
+        </p:txBody>
+      </p:sp>
+      <p:sp>
+        <p:nvSpPr>
+          <p:cNvPr id="126" name="TextBox 125">
+            <a:extLst>
+              <a:ext uri="{FF2B5EF4-FFF2-40B4-BE49-F238E27FC236}">
+                <a16:creationId xmlns:a16="http://schemas.microsoft.com/office/drawing/2014/main" id="{17CB5A6F-E45A-C4EF-5FAF-A1A2F957B5C8}"/>
+              </a:ext>
+            </a:extLst>
+          </p:cNvPr>
+          <p:cNvSpPr txBox="1"/>
+          <p:nvPr/>
+        </p:nvSpPr>
+        <p:spPr>
+          <a:xfrm>
+            <a:off x="4008210" y="6438260"/>
+            <a:ext cx="1400170" cy="276999"/>
+          </a:xfrm>
+          <a:prstGeom prst="rect">
+            <a:avLst/>
+          </a:prstGeom>
+          <a:noFill/>
+        </p:spPr>
+        <p:txBody>
+          <a:bodyPr wrap="square" rtlCol="0">
+            <a:spAutoFit/>
+          </a:bodyPr>
+          <a:lstStyle/>
+          <a:p>
+            <a:pPr algn="ctr"/>
+            <a:r>
+              <a:rPr lang="en-GB" sz="1200" dirty="0"/>
+              <a:t>Tokens</a:t>
+            </a:r>
+          </a:p>
+        </p:txBody>
+      </p:sp>
+      <p:sp>
+        <p:nvSpPr>
+          <p:cNvPr id="13" name="Rectangle 12">
+            <a:extLst>
+              <a:ext uri="{FF2B5EF4-FFF2-40B4-BE49-F238E27FC236}">
+                <a16:creationId xmlns:a16="http://schemas.microsoft.com/office/drawing/2014/main" id="{E6AE26B0-E2ED-AB88-79A0-66563BF214A2}"/>
+              </a:ext>
+            </a:extLst>
+          </p:cNvPr>
+          <p:cNvSpPr/>
+          <p:nvPr/>
+        </p:nvSpPr>
+        <p:spPr>
+          <a:xfrm>
+            <a:off x="3050982" y="436763"/>
+            <a:ext cx="1486851" cy="207981"/>
+          </a:xfrm>
+          <a:prstGeom prst="rect">
+            <a:avLst/>
+          </a:prstGeom>
+          <a:solidFill>
+            <a:schemeClr val="accent3">
+              <a:lumMod val="20000"/>
+              <a:lumOff val="80000"/>
+            </a:schemeClr>
+          </a:solidFill>
+          <a:ln w="12700">
+            <a:solidFill>
+              <a:schemeClr val="tx1"/>
+            </a:solidFill>
+          </a:ln>
+        </p:spPr>
+        <p:style>
+          <a:lnRef idx="2">
+            <a:schemeClr val="accent1">
+              <a:shade val="15000"/>
+            </a:schemeClr>
+          </a:lnRef>
+          <a:fillRef idx="1">
+            <a:schemeClr val="accent1"/>
+          </a:fillRef>
+          <a:effectRef idx="0">
+            <a:schemeClr val="accent1"/>
+          </a:effectRef>
+          <a:fontRef idx="minor">
+            <a:schemeClr val="lt1"/>
+          </a:fontRef>
+        </p:style>
+        <p:txBody>
+          <a:bodyPr rtlCol="0" anchor="ctr"/>
+          <a:lstStyle/>
+          <a:p>
+            <a:pPr algn="ctr"/>
+            <a:r>
+              <a:rPr lang="en-GB" sz="1100" dirty="0">
+                <a:solidFill>
+                  <a:schemeClr val="tx1"/>
+                </a:solidFill>
+              </a:rPr>
+              <a:t>Text Prediction</a:t>
+            </a:r>
+          </a:p>
+        </p:txBody>
+      </p:sp>
+      <p:sp>
+        <p:nvSpPr>
+          <p:cNvPr id="24" name="Rectangle 23">
+            <a:extLst>
+              <a:ext uri="{FF2B5EF4-FFF2-40B4-BE49-F238E27FC236}">
+                <a16:creationId xmlns:a16="http://schemas.microsoft.com/office/drawing/2014/main" id="{18CD8D4E-D02C-E804-DF7B-E402182934FE}"/>
+              </a:ext>
+            </a:extLst>
+          </p:cNvPr>
+          <p:cNvSpPr/>
+          <p:nvPr/>
+        </p:nvSpPr>
+        <p:spPr>
+          <a:xfrm>
+            <a:off x="4870259" y="436763"/>
+            <a:ext cx="1486851" cy="207981"/>
+          </a:xfrm>
+          <a:prstGeom prst="rect">
+            <a:avLst/>
+          </a:prstGeom>
+          <a:solidFill>
+            <a:schemeClr val="accent3">
+              <a:lumMod val="20000"/>
+              <a:lumOff val="80000"/>
+            </a:schemeClr>
+          </a:solidFill>
+          <a:ln w="12700">
+            <a:solidFill>
+              <a:schemeClr val="tx1"/>
+            </a:solidFill>
+          </a:ln>
+        </p:spPr>
+        <p:style>
+          <a:lnRef idx="2">
+            <a:schemeClr val="accent1">
+              <a:shade val="15000"/>
+            </a:schemeClr>
+          </a:lnRef>
+          <a:fillRef idx="1">
+            <a:schemeClr val="accent1"/>
+          </a:fillRef>
+          <a:effectRef idx="0">
+            <a:schemeClr val="accent1"/>
+          </a:effectRef>
+          <a:fontRef idx="minor">
+            <a:schemeClr val="lt1"/>
+          </a:fontRef>
+        </p:style>
+        <p:txBody>
+          <a:bodyPr rtlCol="0" anchor="ctr"/>
+          <a:lstStyle/>
+          <a:p>
+            <a:pPr algn="ctr"/>
+            <a:r>
+              <a:rPr lang="en-GB" sz="1100" dirty="0">
+                <a:solidFill>
+                  <a:schemeClr val="tx1"/>
+                </a:solidFill>
+              </a:rPr>
+              <a:t>Task Classifier</a:t>
+            </a:r>
+          </a:p>
+        </p:txBody>
+      </p:sp>
       <p:cxnSp>
         <p:nvCxnSpPr>
-          <p:cNvPr id="106" name="Straight Arrow Connector 105">
-            <a:extLst>
-              <a:ext uri="{FF2B5EF4-FFF2-40B4-BE49-F238E27FC236}">
-                <a16:creationId xmlns:a16="http://schemas.microsoft.com/office/drawing/2014/main" id="{82CED454-2917-3B0D-C923-0B121D0AD7D6}"/>
+          <p:cNvPr id="43" name="Connector: Elbow 42">
+            <a:extLst>
+              <a:ext uri="{FF2B5EF4-FFF2-40B4-BE49-F238E27FC236}">
+                <a16:creationId xmlns:a16="http://schemas.microsoft.com/office/drawing/2014/main" id="{AC69C7E1-22EE-8C0C-DDF9-74496DB89C31}"/>
               </a:ext>
             </a:extLst>
           </p:cNvPr>
           <p:cNvCxnSpPr>
             <a:cxnSpLocks/>
-            <a:stCxn id="126" idx="0"/>
-            <a:endCxn id="5" idx="2"/>
+            <a:stCxn id="13" idx="2"/>
+            <a:endCxn id="24" idx="2"/>
           </p:cNvCxnSpPr>
           <p:nvPr/>
         </p:nvCxnSpPr>
         <p:spPr>
+          <a:xfrm rot="16200000" flipH="1">
+            <a:off x="4704046" y="-264895"/>
+            <a:ext cx="12700" cy="1819277"/>
+          </a:xfrm>
+          <a:prstGeom prst="bentConnector3">
+            <a:avLst>
+              <a:gd name="adj1" fmla="val 1800000"/>
+            </a:avLst>
+          </a:prstGeom>
+          <a:ln w="12700">
+            <a:solidFill>
+              <a:schemeClr val="tx1"/>
+            </a:solidFill>
+            <a:headEnd type="triangle" w="med" len="med"/>
+            <a:tailEnd type="triangle" w="med" len="med"/>
+          </a:ln>
+        </p:spPr>
+        <p:style>
+          <a:lnRef idx="2">
+            <a:schemeClr val="accent1"/>
+          </a:lnRef>
+          <a:fillRef idx="0">
+            <a:schemeClr val="accent1"/>
+          </a:fillRef>
+          <a:effectRef idx="1">
+            <a:schemeClr val="accent1"/>
+          </a:effectRef>
+          <a:fontRef idx="minor">
+            <a:schemeClr val="tx1"/>
+          </a:fontRef>
+        </p:style>
+      </p:cxnSp>
+      <p:cxnSp>
+        <p:nvCxnSpPr>
+          <p:cNvPr id="44" name="Straight Arrow Connector 43">
+            <a:extLst>
+              <a:ext uri="{FF2B5EF4-FFF2-40B4-BE49-F238E27FC236}">
+                <a16:creationId xmlns:a16="http://schemas.microsoft.com/office/drawing/2014/main" id="{F2CEB95C-022E-0AAB-BB2D-5161D02B63F4}"/>
+              </a:ext>
+            </a:extLst>
+          </p:cNvPr>
+          <p:cNvCxnSpPr>
+            <a:cxnSpLocks/>
+          </p:cNvCxnSpPr>
+          <p:nvPr/>
+        </p:nvCxnSpPr>
+        <p:spPr>
           <a:xfrm flipH="1" flipV="1">
-            <a:off x="4704046" y="6084397"/>
-            <a:ext cx="4249" cy="353863"/>
+            <a:off x="4694867" y="859925"/>
+            <a:ext cx="1" cy="372208"/>
           </a:xfrm>
           <a:prstGeom prst="straightConnector1">
             <a:avLst/>
@@ -5051,7 +5271,8 @@
             <a:solidFill>
               <a:schemeClr val="tx1"/>
             </a:solidFill>
-            <a:tailEnd type="triangle"/>
+            <a:headEnd type="none" w="med" len="med"/>
+            <a:tailEnd type="none" w="med" len="med"/>
           </a:ln>
         </p:spPr>
         <p:style>
@@ -5071,10 +5292,10 @@
       </p:cxnSp>
       <p:sp>
         <p:nvSpPr>
-          <p:cNvPr id="117" name="TextBox 116">
-            <a:extLst>
-              <a:ext uri="{FF2B5EF4-FFF2-40B4-BE49-F238E27FC236}">
-                <a16:creationId xmlns:a16="http://schemas.microsoft.com/office/drawing/2014/main" id="{B4116A31-89B9-DA09-13DC-7CD905EAC59A}"/>
+          <p:cNvPr id="51" name="TextBox 50">
+            <a:extLst>
+              <a:ext uri="{FF2B5EF4-FFF2-40B4-BE49-F238E27FC236}">
+                <a16:creationId xmlns:a16="http://schemas.microsoft.com/office/drawing/2014/main" id="{D2C6641B-C45F-5C27-676D-0A2939ACC1F8}"/>
               </a:ext>
             </a:extLst>
           </p:cNvPr>
@@ -5083,8 +5304,8 @@
         </p:nvSpPr>
         <p:spPr>
           <a:xfrm>
-            <a:off x="3167058" y="1717900"/>
-            <a:ext cx="1114425" cy="307777"/>
+            <a:off x="6463320" y="314078"/>
+            <a:ext cx="1033807" cy="461665"/>
           </a:xfrm>
           <a:prstGeom prst="rect">
             <a:avLst/>
@@ -5097,161 +5318,16 @@
           </a:bodyPr>
           <a:lstStyle/>
           <a:p>
-            <a:pPr algn="ctr"/>
-            <a:r>
-              <a:rPr lang="en-GB" sz="1400" dirty="0"/>
-              <a:t>Transformer</a:t>
-            </a:r>
-          </a:p>
-        </p:txBody>
-      </p:sp>
-      <p:sp>
-        <p:nvSpPr>
-          <p:cNvPr id="118" name="TextBox 117">
-            <a:extLst>
-              <a:ext uri="{FF2B5EF4-FFF2-40B4-BE49-F238E27FC236}">
-                <a16:creationId xmlns:a16="http://schemas.microsoft.com/office/drawing/2014/main" id="{439F4E1A-0DB3-1138-47F0-02D9827B359C}"/>
-              </a:ext>
-            </a:extLst>
-          </p:cNvPr>
-          <p:cNvSpPr txBox="1"/>
-          <p:nvPr/>
-        </p:nvSpPr>
-        <p:spPr>
-          <a:xfrm>
-            <a:off x="2608546" y="769361"/>
-            <a:ext cx="877082" cy="584775"/>
-          </a:xfrm>
-          <a:prstGeom prst="rect">
-            <a:avLst/>
-          </a:prstGeom>
-          <a:noFill/>
-        </p:spPr>
-        <p:txBody>
-          <a:bodyPr wrap="square" rtlCol="0">
-            <a:spAutoFit/>
-          </a:bodyPr>
-          <a:lstStyle/>
-          <a:p>
-            <a:pPr algn="ctr"/>
-            <a:r>
-              <a:rPr lang="en-GB" sz="1600" dirty="0"/>
-              <a:t>GPT-2</a:t>
+            <a:r>
+              <a:rPr lang="en-GB" sz="1200" dirty="0"/>
+              <a:t>Application</a:t>
             </a:r>
             <a:br>
-              <a:rPr lang="en-GB" sz="1600" dirty="0"/>
+              <a:rPr lang="en-GB" sz="1200" dirty="0"/>
             </a:br>
             <a:r>
-              <a:rPr lang="en-GB" sz="1600" dirty="0"/>
-              <a:t>Model</a:t>
-            </a:r>
-          </a:p>
-        </p:txBody>
-      </p:sp>
-      <p:sp>
-        <p:nvSpPr>
-          <p:cNvPr id="119" name="TextBox 118">
-            <a:extLst>
-              <a:ext uri="{FF2B5EF4-FFF2-40B4-BE49-F238E27FC236}">
-                <a16:creationId xmlns:a16="http://schemas.microsoft.com/office/drawing/2014/main" id="{4056CF37-1FCE-8CE6-D031-404C6C3C7624}"/>
-              </a:ext>
-            </a:extLst>
-          </p:cNvPr>
-          <p:cNvSpPr txBox="1"/>
-          <p:nvPr/>
-        </p:nvSpPr>
-        <p:spPr>
-          <a:xfrm rot="16200000">
-            <a:off x="1240391" y="3388861"/>
-            <a:ext cx="3601999" cy="307777"/>
-          </a:xfrm>
-          <a:prstGeom prst="rect">
-            <a:avLst/>
-          </a:prstGeom>
-          <a:noFill/>
-        </p:spPr>
-        <p:txBody>
-          <a:bodyPr wrap="square" rtlCol="0">
-            <a:spAutoFit/>
-          </a:bodyPr>
-          <a:lstStyle/>
-          <a:p>
-            <a:pPr algn="ctr"/>
-            <a:r>
-              <a:rPr lang="en-GB" sz="1400" dirty="0"/>
-              <a:t>Stacked N times</a:t>
-            </a:r>
-          </a:p>
-        </p:txBody>
-      </p:sp>
-      <p:sp>
-        <p:nvSpPr>
-          <p:cNvPr id="126" name="TextBox 125">
-            <a:extLst>
-              <a:ext uri="{FF2B5EF4-FFF2-40B4-BE49-F238E27FC236}">
-                <a16:creationId xmlns:a16="http://schemas.microsoft.com/office/drawing/2014/main" id="{17CB5A6F-E45A-C4EF-5FAF-A1A2F957B5C8}"/>
-              </a:ext>
-            </a:extLst>
-          </p:cNvPr>
-          <p:cNvSpPr txBox="1"/>
-          <p:nvPr/>
-        </p:nvSpPr>
-        <p:spPr>
-          <a:xfrm>
-            <a:off x="4008210" y="6438260"/>
-            <a:ext cx="1400170" cy="276999"/>
-          </a:xfrm>
-          <a:prstGeom prst="rect">
-            <a:avLst/>
-          </a:prstGeom>
-          <a:noFill/>
-        </p:spPr>
-        <p:txBody>
-          <a:bodyPr wrap="square" rtlCol="0">
-            <a:spAutoFit/>
-          </a:bodyPr>
-          <a:lstStyle/>
-          <a:p>
-            <a:pPr algn="ctr"/>
-            <a:r>
               <a:rPr lang="en-GB" sz="1200" dirty="0"/>
-              <a:t>Tokens</a:t>
-            </a:r>
-          </a:p>
-        </p:txBody>
-      </p:sp>
-      <p:sp>
-        <p:nvSpPr>
-          <p:cNvPr id="2" name="TextBox 1">
-            <a:extLst>
-              <a:ext uri="{FF2B5EF4-FFF2-40B4-BE49-F238E27FC236}">
-                <a16:creationId xmlns:a16="http://schemas.microsoft.com/office/drawing/2014/main" id="{BFF51514-B523-7A2B-F253-EBA5EEE99B21}"/>
-              </a:ext>
-            </a:extLst>
-          </p:cNvPr>
-          <p:cNvSpPr txBox="1"/>
-          <p:nvPr/>
-        </p:nvSpPr>
-        <p:spPr>
-          <a:xfrm>
-            <a:off x="3791392" y="294730"/>
-            <a:ext cx="1821085" cy="276999"/>
-          </a:xfrm>
-          <a:prstGeom prst="rect">
-            <a:avLst/>
-          </a:prstGeom>
-          <a:noFill/>
-        </p:spPr>
-        <p:txBody>
-          <a:bodyPr wrap="square" rtlCol="0">
-            <a:spAutoFit/>
-          </a:bodyPr>
-          <a:lstStyle/>
-          <a:p>
-            <a:pPr algn="ctr"/>
-            <a:r>
-              <a:rPr lang="en-GB" sz="1200" dirty="0"/>
-              <a:t>Next-token Probabilities</a:t>
+              <a:t>Linear Layer</a:t>
             </a:r>
           </a:p>
         </p:txBody>

</xml_diff>